<commit_message>
presentation for tscp 3 added
</commit_message>
<xml_diff>
--- a/doc/TCSP 03.pptx
+++ b/doc/TCSP 03.pptx
@@ -9,13 +9,11 @@
     <p:sldId id="257" r:id="rId3"/>
     <p:sldId id="258" r:id="rId4"/>
     <p:sldId id="259" r:id="rId5"/>
-    <p:sldId id="262" r:id="rId6"/>
-    <p:sldId id="260" r:id="rId7"/>
-    <p:sldId id="263" r:id="rId8"/>
-    <p:sldId id="261" r:id="rId9"/>
-    <p:sldId id="264" r:id="rId10"/>
-    <p:sldId id="266" r:id="rId11"/>
-    <p:sldId id="265" r:id="rId12"/>
+    <p:sldId id="261" r:id="rId6"/>
+    <p:sldId id="264" r:id="rId7"/>
+    <p:sldId id="266" r:id="rId8"/>
+    <p:sldId id="267" r:id="rId9"/>
+    <p:sldId id="265" r:id="rId10"/>
   </p:sldIdLst>
   <p:sldSz cx="9144000" cy="6858000" type="screen4x3"/>
   <p:notesSz cx="6858000" cy="9144000"/>
@@ -298,7 +296,7 @@
           <a:p>
             <a:fld id="{9B1A5DFA-1F7B-4C91-BDEA-11B8043A9768}" type="datetimeFigureOut">
               <a:rPr lang="en-US" smtClean="0"/>
-              <a:t>9/17/2013</a:t>
+              <a:t>10/7/2013</a:t>
             </a:fld>
             <a:endParaRPr lang="en-US"/>
           </a:p>
@@ -468,7 +466,7 @@
           <a:p>
             <a:fld id="{9B1A5DFA-1F7B-4C91-BDEA-11B8043A9768}" type="datetimeFigureOut">
               <a:rPr lang="en-US" smtClean="0"/>
-              <a:t>9/17/2013</a:t>
+              <a:t>10/7/2013</a:t>
             </a:fld>
             <a:endParaRPr lang="en-US"/>
           </a:p>
@@ -648,7 +646,7 @@
           <a:p>
             <a:fld id="{9B1A5DFA-1F7B-4C91-BDEA-11B8043A9768}" type="datetimeFigureOut">
               <a:rPr lang="en-US" smtClean="0"/>
-              <a:t>9/17/2013</a:t>
+              <a:t>10/7/2013</a:t>
             </a:fld>
             <a:endParaRPr lang="en-US"/>
           </a:p>
@@ -818,7 +816,7 @@
           <a:p>
             <a:fld id="{9B1A5DFA-1F7B-4C91-BDEA-11B8043A9768}" type="datetimeFigureOut">
               <a:rPr lang="en-US" smtClean="0"/>
-              <a:t>9/17/2013</a:t>
+              <a:t>10/7/2013</a:t>
             </a:fld>
             <a:endParaRPr lang="en-US"/>
           </a:p>
@@ -1064,7 +1062,7 @@
           <a:p>
             <a:fld id="{9B1A5DFA-1F7B-4C91-BDEA-11B8043A9768}" type="datetimeFigureOut">
               <a:rPr lang="en-US" smtClean="0"/>
-              <a:t>9/17/2013</a:t>
+              <a:t>10/7/2013</a:t>
             </a:fld>
             <a:endParaRPr lang="en-US"/>
           </a:p>
@@ -1352,7 +1350,7 @@
           <a:p>
             <a:fld id="{9B1A5DFA-1F7B-4C91-BDEA-11B8043A9768}" type="datetimeFigureOut">
               <a:rPr lang="en-US" smtClean="0"/>
-              <a:t>9/17/2013</a:t>
+              <a:t>10/7/2013</a:t>
             </a:fld>
             <a:endParaRPr lang="en-US"/>
           </a:p>
@@ -1774,7 +1772,7 @@
           <a:p>
             <a:fld id="{9B1A5DFA-1F7B-4C91-BDEA-11B8043A9768}" type="datetimeFigureOut">
               <a:rPr lang="en-US" smtClean="0"/>
-              <a:t>9/17/2013</a:t>
+              <a:t>10/7/2013</a:t>
             </a:fld>
             <a:endParaRPr lang="en-US"/>
           </a:p>
@@ -1892,7 +1890,7 @@
           <a:p>
             <a:fld id="{9B1A5DFA-1F7B-4C91-BDEA-11B8043A9768}" type="datetimeFigureOut">
               <a:rPr lang="en-US" smtClean="0"/>
-              <a:t>9/17/2013</a:t>
+              <a:t>10/7/2013</a:t>
             </a:fld>
             <a:endParaRPr lang="en-US"/>
           </a:p>
@@ -1987,7 +1985,7 @@
           <a:p>
             <a:fld id="{9B1A5DFA-1F7B-4C91-BDEA-11B8043A9768}" type="datetimeFigureOut">
               <a:rPr lang="en-US" smtClean="0"/>
-              <a:t>9/17/2013</a:t>
+              <a:t>10/7/2013</a:t>
             </a:fld>
             <a:endParaRPr lang="en-US"/>
           </a:p>
@@ -2264,7 +2262,7 @@
           <a:p>
             <a:fld id="{9B1A5DFA-1F7B-4C91-BDEA-11B8043A9768}" type="datetimeFigureOut">
               <a:rPr lang="en-US" smtClean="0"/>
-              <a:t>9/17/2013</a:t>
+              <a:t>10/7/2013</a:t>
             </a:fld>
             <a:endParaRPr lang="en-US"/>
           </a:p>
@@ -2517,7 +2515,7 @@
           <a:p>
             <a:fld id="{9B1A5DFA-1F7B-4C91-BDEA-11B8043A9768}" type="datetimeFigureOut">
               <a:rPr lang="en-US" smtClean="0"/>
-              <a:t>9/17/2013</a:t>
+              <a:t>10/7/2013</a:t>
             </a:fld>
             <a:endParaRPr lang="en-US"/>
           </a:p>
@@ -2730,7 +2728,7 @@
           <a:p>
             <a:fld id="{9B1A5DFA-1F7B-4C91-BDEA-11B8043A9768}" type="datetimeFigureOut">
               <a:rPr lang="en-US" smtClean="0"/>
-              <a:t>9/17/2013</a:t>
+              <a:t>10/7/2013</a:t>
             </a:fld>
             <a:endParaRPr lang="en-US"/>
           </a:p>
@@ -3199,259 +3197,6 @@
 </p:sld>
 </file>
 
-<file path=ppt/slides/slide10.xml><?xml version="1.0" encoding="utf-8"?>
-<p:sld xmlns:a="http://schemas.openxmlformats.org/drawingml/2006/main" xmlns:r="http://schemas.openxmlformats.org/officeDocument/2006/relationships" xmlns:p="http://schemas.openxmlformats.org/presentationml/2006/main">
-  <p:cSld>
-    <p:spTree>
-      <p:nvGrpSpPr>
-        <p:cNvPr id="1" name=""/>
-        <p:cNvGrpSpPr/>
-        <p:nvPr/>
-      </p:nvGrpSpPr>
-      <p:grpSpPr>
-        <a:xfrm>
-          <a:off x="0" y="0"/>
-          <a:ext cx="0" cy="0"/>
-          <a:chOff x="0" y="0"/>
-          <a:chExt cx="0" cy="0"/>
-        </a:xfrm>
-      </p:grpSpPr>
-      <p:sp>
-        <p:nvSpPr>
-          <p:cNvPr id="2" name="Title 1"/>
-          <p:cNvSpPr>
-            <a:spLocks noGrp="1"/>
-          </p:cNvSpPr>
-          <p:nvPr>
-            <p:ph type="title"/>
-          </p:nvPr>
-        </p:nvSpPr>
-        <p:spPr/>
-        <p:txBody>
-          <a:bodyPr/>
-          <a:lstStyle/>
-          <a:p>
-            <a:endParaRPr lang="en-US"/>
-          </a:p>
-        </p:txBody>
-      </p:sp>
-      <p:sp>
-        <p:nvSpPr>
-          <p:cNvPr id="3" name="Content Placeholder 2"/>
-          <p:cNvSpPr>
-            <a:spLocks noGrp="1"/>
-          </p:cNvSpPr>
-          <p:nvPr>
-            <p:ph idx="1"/>
-          </p:nvPr>
-        </p:nvSpPr>
-        <p:spPr/>
-        <p:txBody>
-          <a:bodyPr/>
-          <a:lstStyle/>
-          <a:p>
-            <a:endParaRPr lang="en-US"/>
-          </a:p>
-        </p:txBody>
-      </p:sp>
-      <p:pic>
-        <p:nvPicPr>
-          <p:cNvPr id="5122" name="Picture 2"/>
-          <p:cNvPicPr>
-            <a:picLocks noChangeAspect="1" noChangeArrowheads="1"/>
-          </p:cNvPicPr>
-          <p:nvPr/>
-        </p:nvPicPr>
-        <p:blipFill>
-          <a:blip r:embed="rId2">
-            <a:extLst>
-              <a:ext uri="{28A0092B-C50C-407E-A947-70E740481C1C}">
-                <a14:useLocalDpi xmlns:a14="http://schemas.microsoft.com/office/drawing/2010/main" val="0"/>
-              </a:ext>
-            </a:extLst>
-          </a:blip>
-          <a:srcRect/>
-          <a:stretch>
-            <a:fillRect/>
-          </a:stretch>
-        </p:blipFill>
-        <p:spPr bwMode="auto">
-          <a:xfrm>
-            <a:off x="26444" y="381000"/>
-            <a:ext cx="9131410" cy="5943600"/>
-          </a:xfrm>
-          <a:prstGeom prst="rect">
-            <a:avLst/>
-          </a:prstGeom>
-          <a:noFill/>
-          <a:ln>
-            <a:noFill/>
-          </a:ln>
-          <a:extLst>
-            <a:ext uri="{909E8E84-426E-40DD-AFC4-6F175D3DCCD1}">
-              <a14:hiddenFill xmlns:a14="http://schemas.microsoft.com/office/drawing/2010/main">
-                <a:solidFill>
-                  <a:schemeClr val="accent1"/>
-                </a:solidFill>
-              </a14:hiddenFill>
-            </a:ext>
-            <a:ext uri="{91240B29-F687-4F45-9708-019B960494DF}">
-              <a14:hiddenLine xmlns:a14="http://schemas.microsoft.com/office/drawing/2010/main" w="9525">
-                <a:solidFill>
-                  <a:schemeClr val="tx1"/>
-                </a:solidFill>
-                <a:miter lim="800000"/>
-                <a:headEnd/>
-                <a:tailEnd/>
-              </a14:hiddenLine>
-            </a:ext>
-          </a:extLst>
-        </p:spPr>
-      </p:pic>
-    </p:spTree>
-    <p:extLst>
-      <p:ext uri="{BB962C8B-B14F-4D97-AF65-F5344CB8AC3E}">
-        <p14:creationId xmlns:p14="http://schemas.microsoft.com/office/powerpoint/2010/main" val="4244391296"/>
-      </p:ext>
-    </p:extLst>
-  </p:cSld>
-  <p:clrMapOvr>
-    <a:masterClrMapping/>
-  </p:clrMapOvr>
-  <p:timing>
-    <p:tnLst>
-      <p:par>
-        <p:cTn id="1" dur="indefinite" restart="never" nodeType="tmRoot"/>
-      </p:par>
-    </p:tnLst>
-  </p:timing>
-</p:sld>
-</file>
-
-<file path=ppt/slides/slide11.xml><?xml version="1.0" encoding="utf-8"?>
-<p:sld xmlns:a="http://schemas.openxmlformats.org/drawingml/2006/main" xmlns:r="http://schemas.openxmlformats.org/officeDocument/2006/relationships" xmlns:p="http://schemas.openxmlformats.org/presentationml/2006/main">
-  <p:cSld>
-    <p:spTree>
-      <p:nvGrpSpPr>
-        <p:cNvPr id="1" name=""/>
-        <p:cNvGrpSpPr/>
-        <p:nvPr/>
-      </p:nvGrpSpPr>
-      <p:grpSpPr>
-        <a:xfrm>
-          <a:off x="0" y="0"/>
-          <a:ext cx="0" cy="0"/>
-          <a:chOff x="0" y="0"/>
-          <a:chExt cx="0" cy="0"/>
-        </a:xfrm>
-      </p:grpSpPr>
-      <p:sp>
-        <p:nvSpPr>
-          <p:cNvPr id="2" name="Title 1"/>
-          <p:cNvSpPr>
-            <a:spLocks noGrp="1"/>
-          </p:cNvSpPr>
-          <p:nvPr>
-            <p:ph type="title"/>
-          </p:nvPr>
-        </p:nvSpPr>
-        <p:spPr/>
-        <p:txBody>
-          <a:bodyPr/>
-          <a:lstStyle/>
-          <a:p>
-            <a:r>
-              <a:rPr lang="en-US" dirty="0" smtClean="0"/>
-              <a:t>Materials and Tools</a:t>
-            </a:r>
-            <a:endParaRPr lang="en-US" dirty="0"/>
-          </a:p>
-        </p:txBody>
-      </p:sp>
-      <p:sp>
-        <p:nvSpPr>
-          <p:cNvPr id="3" name="Content Placeholder 2"/>
-          <p:cNvSpPr>
-            <a:spLocks noGrp="1"/>
-          </p:cNvSpPr>
-          <p:nvPr>
-            <p:ph idx="1"/>
-          </p:nvPr>
-        </p:nvSpPr>
-        <p:spPr/>
-        <p:txBody>
-          <a:bodyPr/>
-          <a:lstStyle/>
-          <a:p>
-            <a:r>
-              <a:rPr lang="en-US" dirty="0" smtClean="0"/>
-              <a:t>Hat/helmet</a:t>
-            </a:r>
-          </a:p>
-          <a:p>
-            <a:r>
-              <a:rPr lang="en-US" dirty="0" smtClean="0"/>
-              <a:t>Boxes for display, PCB/battery stack</a:t>
-            </a:r>
-          </a:p>
-          <a:p>
-            <a:r>
-              <a:rPr lang="en-US" dirty="0" err="1" smtClean="0"/>
-              <a:t>Beamsplitter</a:t>
-            </a:r>
-            <a:r>
-              <a:rPr lang="en-US" dirty="0" smtClean="0"/>
-              <a:t> glass</a:t>
-            </a:r>
-          </a:p>
-          <a:p>
-            <a:pPr lvl="1"/>
-            <a:r>
-              <a:rPr lang="en-US" dirty="0" smtClean="0"/>
-              <a:t>needs specialized cutting tools</a:t>
-            </a:r>
-          </a:p>
-          <a:p>
-            <a:r>
-              <a:rPr lang="en-US" dirty="0" smtClean="0"/>
-              <a:t>Frame for glass</a:t>
-            </a:r>
-          </a:p>
-          <a:p>
-            <a:pPr lvl="1"/>
-            <a:r>
-              <a:rPr lang="en-US" dirty="0" smtClean="0"/>
-              <a:t>3d printed</a:t>
-            </a:r>
-          </a:p>
-          <a:p>
-            <a:pPr marL="457200" lvl="1" indent="0">
-              <a:buNone/>
-            </a:pPr>
-            <a:endParaRPr lang="en-US" dirty="0"/>
-          </a:p>
-        </p:txBody>
-      </p:sp>
-    </p:spTree>
-    <p:extLst>
-      <p:ext uri="{BB962C8B-B14F-4D97-AF65-F5344CB8AC3E}">
-        <p14:creationId xmlns:p14="http://schemas.microsoft.com/office/powerpoint/2010/main" val="931493629"/>
-      </p:ext>
-    </p:extLst>
-  </p:cSld>
-  <p:clrMapOvr>
-    <a:masterClrMapping/>
-  </p:clrMapOvr>
-  <p:timing>
-    <p:tnLst>
-      <p:par>
-        <p:cTn id="1" dur="indefinite" restart="never" nodeType="tmRoot"/>
-      </p:par>
-    </p:tnLst>
-  </p:timing>
-</p:sld>
-</file>
-
 <file path=ppt/slides/slide2.xml><?xml version="1.0" encoding="utf-8"?>
 <p:sld xmlns:a="http://schemas.openxmlformats.org/drawingml/2006/main" xmlns:r="http://schemas.openxmlformats.org/officeDocument/2006/relationships" xmlns:p="http://schemas.openxmlformats.org/presentationml/2006/main">
   <p:cSld>
@@ -4636,786 +4381,6 @@
           <a:bodyPr/>
           <a:lstStyle/>
           <a:p>
-            <a:r>
-              <a:rPr lang="en-US" dirty="0" err="1" smtClean="0"/>
-              <a:t>Vuzix</a:t>
-            </a:r>
-            <a:r>
-              <a:rPr lang="en-US" dirty="0" smtClean="0"/>
-              <a:t> 1200AR</a:t>
-            </a:r>
-            <a:endParaRPr lang="en-US" dirty="0"/>
-          </a:p>
-        </p:txBody>
-      </p:sp>
-      <p:sp>
-        <p:nvSpPr>
-          <p:cNvPr id="3" name="Content Placeholder 2"/>
-          <p:cNvSpPr>
-            <a:spLocks noGrp="1"/>
-          </p:cNvSpPr>
-          <p:nvPr>
-            <p:ph idx="1"/>
-          </p:nvPr>
-        </p:nvSpPr>
-        <p:spPr/>
-        <p:txBody>
-          <a:bodyPr/>
-          <a:lstStyle/>
-          <a:p>
-            <a:endParaRPr lang="en-US" dirty="0" smtClean="0"/>
-          </a:p>
-          <a:p>
-            <a:r>
-              <a:rPr lang="en-US" dirty="0" smtClean="0"/>
-              <a:t>Opaque display takes up entire field of view</a:t>
-            </a:r>
-          </a:p>
-          <a:p>
-            <a:r>
-              <a:rPr lang="en-US" dirty="0" smtClean="0"/>
-              <a:t>Uses two front mounted cameras for overlay</a:t>
-            </a:r>
-            <a:endParaRPr lang="en-US" dirty="0"/>
-          </a:p>
-        </p:txBody>
-      </p:sp>
-      <p:pic>
-        <p:nvPicPr>
-          <p:cNvPr id="3074" name="Picture 2" descr="http://www.blogcdn.com/www.engadget.com/media/2013/02/vuzix-wrap1200ar.jpg"/>
-          <p:cNvPicPr>
-            <a:picLocks noChangeAspect="1" noChangeArrowheads="1"/>
-          </p:cNvPicPr>
-          <p:nvPr/>
-        </p:nvPicPr>
-        <p:blipFill>
-          <a:blip r:embed="rId2">
-            <a:extLst>
-              <a:ext uri="{28A0092B-C50C-407E-A947-70E740481C1C}">
-                <a14:useLocalDpi xmlns:a14="http://schemas.microsoft.com/office/drawing/2010/main" val="0"/>
-              </a:ext>
-            </a:extLst>
-          </a:blip>
-          <a:srcRect/>
-          <a:stretch>
-            <a:fillRect/>
-          </a:stretch>
-        </p:blipFill>
-        <p:spPr bwMode="auto">
-          <a:xfrm>
-            <a:off x="2721159" y="4267200"/>
-            <a:ext cx="4762500" cy="2114550"/>
-          </a:xfrm>
-          <a:prstGeom prst="rect">
-            <a:avLst/>
-          </a:prstGeom>
-          <a:noFill/>
-          <a:extLst>
-            <a:ext uri="{909E8E84-426E-40DD-AFC4-6F175D3DCCD1}">
-              <a14:hiddenFill xmlns:a14="http://schemas.microsoft.com/office/drawing/2010/main">
-                <a:solidFill>
-                  <a:srgbClr val="FFFFFF"/>
-                </a:solidFill>
-              </a14:hiddenFill>
-            </a:ext>
-          </a:extLst>
-        </p:spPr>
-      </p:pic>
-    </p:spTree>
-    <p:extLst>
-      <p:ext uri="{BB962C8B-B14F-4D97-AF65-F5344CB8AC3E}">
-        <p14:creationId xmlns:p14="http://schemas.microsoft.com/office/powerpoint/2010/main" val="3076722112"/>
-      </p:ext>
-    </p:extLst>
-  </p:cSld>
-  <p:clrMapOvr>
-    <a:masterClrMapping/>
-  </p:clrMapOvr>
-  <p:timing>
-    <p:tnLst>
-      <p:par>
-        <p:cTn id="1" dur="indefinite" restart="never" nodeType="tmRoot"/>
-      </p:par>
-    </p:tnLst>
-  </p:timing>
-</p:sld>
-</file>
-
-<file path=ppt/slides/slide6.xml><?xml version="1.0" encoding="utf-8"?>
-<p:sld xmlns:a="http://schemas.openxmlformats.org/drawingml/2006/main" xmlns:r="http://schemas.openxmlformats.org/officeDocument/2006/relationships" xmlns:p="http://schemas.openxmlformats.org/presentationml/2006/main">
-  <p:cSld>
-    <p:spTree>
-      <p:nvGrpSpPr>
-        <p:cNvPr id="1" name=""/>
-        <p:cNvGrpSpPr/>
-        <p:nvPr/>
-      </p:nvGrpSpPr>
-      <p:grpSpPr>
-        <a:xfrm>
-          <a:off x="0" y="0"/>
-          <a:ext cx="0" cy="0"/>
-          <a:chOff x="0" y="0"/>
-          <a:chExt cx="0" cy="0"/>
-        </a:xfrm>
-      </p:grpSpPr>
-      <p:sp>
-        <p:nvSpPr>
-          <p:cNvPr id="2" name="Title 1"/>
-          <p:cNvSpPr>
-            <a:spLocks noGrp="1"/>
-          </p:cNvSpPr>
-          <p:nvPr>
-            <p:ph type="title"/>
-          </p:nvPr>
-        </p:nvSpPr>
-        <p:spPr/>
-        <p:txBody>
-          <a:bodyPr/>
-          <a:lstStyle/>
-          <a:p>
-            <a:r>
-              <a:rPr lang="en-US" dirty="0" smtClean="0"/>
-              <a:t>Epson BT-100</a:t>
-            </a:r>
-            <a:endParaRPr lang="en-US" dirty="0"/>
-          </a:p>
-        </p:txBody>
-      </p:sp>
-      <p:sp>
-        <p:nvSpPr>
-          <p:cNvPr id="3" name="Content Placeholder 2"/>
-          <p:cNvSpPr>
-            <a:spLocks noGrp="1"/>
-          </p:cNvSpPr>
-          <p:nvPr>
-            <p:ph idx="1"/>
-          </p:nvPr>
-        </p:nvSpPr>
-        <p:spPr/>
-        <p:txBody>
-          <a:bodyPr/>
-          <a:lstStyle/>
-          <a:p>
-            <a:r>
-              <a:rPr lang="en-US" dirty="0" smtClean="0"/>
-              <a:t>Transparent display using beam splitters</a:t>
-            </a:r>
-            <a:endParaRPr lang="en-US" dirty="0"/>
-          </a:p>
-        </p:txBody>
-      </p:sp>
-      <p:pic>
-        <p:nvPicPr>
-          <p:cNvPr id="2050" name="Picture 2"/>
-          <p:cNvPicPr>
-            <a:picLocks noChangeAspect="1" noChangeArrowheads="1"/>
-          </p:cNvPicPr>
-          <p:nvPr/>
-        </p:nvPicPr>
-        <p:blipFill>
-          <a:blip r:embed="rId2">
-            <a:extLst>
-              <a:ext uri="{28A0092B-C50C-407E-A947-70E740481C1C}">
-                <a14:useLocalDpi xmlns:a14="http://schemas.microsoft.com/office/drawing/2010/main" val="0"/>
-              </a:ext>
-            </a:extLst>
-          </a:blip>
-          <a:srcRect/>
-          <a:stretch>
-            <a:fillRect/>
-          </a:stretch>
-        </p:blipFill>
-        <p:spPr bwMode="auto">
-          <a:xfrm>
-            <a:off x="1373568" y="3200400"/>
-            <a:ext cx="6381750" cy="3171825"/>
-          </a:xfrm>
-          <a:prstGeom prst="rect">
-            <a:avLst/>
-          </a:prstGeom>
-          <a:noFill/>
-          <a:ln>
-            <a:noFill/>
-          </a:ln>
-          <a:extLst>
-            <a:ext uri="{909E8E84-426E-40DD-AFC4-6F175D3DCCD1}">
-              <a14:hiddenFill xmlns:a14="http://schemas.microsoft.com/office/drawing/2010/main">
-                <a:solidFill>
-                  <a:schemeClr val="accent1"/>
-                </a:solidFill>
-              </a14:hiddenFill>
-            </a:ext>
-            <a:ext uri="{91240B29-F687-4F45-9708-019B960494DF}">
-              <a14:hiddenLine xmlns:a14="http://schemas.microsoft.com/office/drawing/2010/main" w="9525">
-                <a:solidFill>
-                  <a:schemeClr val="tx1"/>
-                </a:solidFill>
-                <a:miter lim="800000"/>
-                <a:headEnd/>
-                <a:tailEnd/>
-              </a14:hiddenLine>
-            </a:ext>
-          </a:extLst>
-        </p:spPr>
-      </p:pic>
-    </p:spTree>
-    <p:extLst>
-      <p:ext uri="{BB962C8B-B14F-4D97-AF65-F5344CB8AC3E}">
-        <p14:creationId xmlns:p14="http://schemas.microsoft.com/office/powerpoint/2010/main" val="2772698540"/>
-      </p:ext>
-    </p:extLst>
-  </p:cSld>
-  <p:clrMapOvr>
-    <a:masterClrMapping/>
-  </p:clrMapOvr>
-  <p:timing>
-    <p:tnLst>
-      <p:par>
-        <p:cTn id="1" dur="indefinite" restart="never" nodeType="tmRoot"/>
-      </p:par>
-    </p:tnLst>
-  </p:timing>
-</p:sld>
-</file>
-
-<file path=ppt/slides/slide7.xml><?xml version="1.0" encoding="utf-8"?>
-<p:sld xmlns:a="http://schemas.openxmlformats.org/drawingml/2006/main" xmlns:r="http://schemas.openxmlformats.org/officeDocument/2006/relationships" xmlns:p="http://schemas.openxmlformats.org/presentationml/2006/main">
-  <p:cSld>
-    <p:spTree>
-      <p:nvGrpSpPr>
-        <p:cNvPr id="1" name=""/>
-        <p:cNvGrpSpPr/>
-        <p:nvPr/>
-      </p:nvGrpSpPr>
-      <p:grpSpPr>
-        <a:xfrm>
-          <a:off x="0" y="0"/>
-          <a:ext cx="0" cy="0"/>
-          <a:chOff x="0" y="0"/>
-          <a:chExt cx="0" cy="0"/>
-        </a:xfrm>
-      </p:grpSpPr>
-      <p:sp>
-        <p:nvSpPr>
-          <p:cNvPr id="2" name="Title 1"/>
-          <p:cNvSpPr>
-            <a:spLocks noGrp="1"/>
-          </p:cNvSpPr>
-          <p:nvPr>
-            <p:ph type="title"/>
-          </p:nvPr>
-        </p:nvSpPr>
-        <p:spPr/>
-        <p:txBody>
-          <a:bodyPr/>
-          <a:lstStyle/>
-          <a:p>
-            <a:r>
-              <a:rPr lang="en-US" dirty="0" smtClean="0"/>
-              <a:t>Comparison</a:t>
-            </a:r>
-            <a:endParaRPr lang="en-US" dirty="0"/>
-          </a:p>
-        </p:txBody>
-      </p:sp>
-      <p:graphicFrame>
-        <p:nvGraphicFramePr>
-          <p:cNvPr id="4" name="Content Placeholder 3"/>
-          <p:cNvGraphicFramePr>
-            <a:graphicFrameLocks noGrp="1"/>
-          </p:cNvGraphicFramePr>
-          <p:nvPr>
-            <p:ph idx="1"/>
-            <p:extLst>
-              <p:ext uri="{D42A27DB-BD31-4B8C-83A1-F6EECF244321}">
-                <p14:modId xmlns:p14="http://schemas.microsoft.com/office/powerpoint/2010/main" val="3442614913"/>
-              </p:ext>
-            </p:extLst>
-          </p:nvPr>
-        </p:nvGraphicFramePr>
-        <p:xfrm>
-          <a:off x="457200" y="1600200"/>
-          <a:ext cx="8229600" cy="4530090"/>
-        </p:xfrm>
-        <a:graphic>
-          <a:graphicData uri="http://schemas.openxmlformats.org/drawingml/2006/table">
-            <a:tbl>
-              <a:tblPr firstRow="1" bandRow="1">
-                <a:tableStyleId>{5C22544A-7EE6-4342-B048-85BDC9FD1C3A}</a:tableStyleId>
-              </a:tblPr>
-              <a:tblGrid>
-                <a:gridCol w="4114800"/>
-                <a:gridCol w="4114800"/>
-              </a:tblGrid>
-              <a:tr h="487680">
-                <a:tc>
-                  <a:txBody>
-                    <a:bodyPr/>
-                    <a:lstStyle/>
-                    <a:p>
-                      <a:r>
-                        <a:rPr lang="en-US" dirty="0" err="1" smtClean="0"/>
-                        <a:t>Beamsplitter</a:t>
-                      </a:r>
-                      <a:endParaRPr lang="en-US" dirty="0"/>
-                    </a:p>
-                  </a:txBody>
-                  <a:tcPr/>
-                </a:tc>
-                <a:tc>
-                  <a:txBody>
-                    <a:bodyPr/>
-                    <a:lstStyle/>
-                    <a:p>
-                      <a:r>
-                        <a:rPr lang="en-US" dirty="0" smtClean="0"/>
-                        <a:t>Camera</a:t>
-                      </a:r>
-                      <a:endParaRPr lang="en-US" dirty="0"/>
-                    </a:p>
-                  </a:txBody>
-                  <a:tcPr/>
-                </a:tc>
-              </a:tr>
-              <a:tr h="487680">
-                <a:tc>
-                  <a:txBody>
-                    <a:bodyPr/>
-                    <a:lstStyle/>
-                    <a:p>
-                      <a:pPr algn="l" rtl="0" fontAlgn="ctr"/>
-                      <a:r>
-                        <a:rPr lang="en-US" sz="1800" b="0" i="0" u="none" strike="noStrike">
-                          <a:solidFill>
-                            <a:srgbClr val="000000"/>
-                          </a:solidFill>
-                          <a:effectLst/>
-                          <a:latin typeface="Calibri"/>
-                        </a:rPr>
-                        <a:t>- Narrow field of view</a:t>
-                      </a:r>
-                    </a:p>
-                  </a:txBody>
-                  <a:tcPr marL="9525" marR="9525" marT="9525" marB="0" anchor="ctr"/>
-                </a:tc>
-                <a:tc>
-                  <a:txBody>
-                    <a:bodyPr/>
-                    <a:lstStyle/>
-                    <a:p>
-                      <a:pPr algn="l" rtl="0" fontAlgn="ctr"/>
-                      <a:r>
-                        <a:rPr lang="en-US" sz="1800" b="0" i="0" u="none" strike="noStrike">
-                          <a:solidFill>
-                            <a:srgbClr val="000000"/>
-                          </a:solidFill>
-                          <a:effectLst/>
-                          <a:latin typeface="Calibri"/>
-                        </a:rPr>
-                        <a:t>+ Wider field of view</a:t>
-                      </a:r>
-                    </a:p>
-                  </a:txBody>
-                  <a:tcPr marL="9525" marR="9525" marT="9525" marB="0" anchor="ctr"/>
-                </a:tc>
-              </a:tr>
-              <a:tr h="487680">
-                <a:tc>
-                  <a:txBody>
-                    <a:bodyPr/>
-                    <a:lstStyle/>
-                    <a:p>
-                      <a:pPr algn="l" rtl="0" fontAlgn="ctr"/>
-                      <a:r>
-                        <a:rPr lang="en-US" sz="1800" b="0" i="0" u="none" strike="noStrike" dirty="0">
-                          <a:solidFill>
-                            <a:srgbClr val="000000"/>
-                          </a:solidFill>
-                          <a:effectLst/>
-                          <a:latin typeface="Calibri"/>
-                        </a:rPr>
-                        <a:t>- Unable to focus on display and background simultaneously</a:t>
-                      </a:r>
-                    </a:p>
-                  </a:txBody>
-                  <a:tcPr marL="9525" marR="9525" marT="9525" marB="0" anchor="ctr"/>
-                </a:tc>
-                <a:tc>
-                  <a:txBody>
-                    <a:bodyPr/>
-                    <a:lstStyle/>
-                    <a:p>
-                      <a:pPr algn="l" rtl="0" fontAlgn="ctr"/>
-                      <a:r>
-                        <a:rPr lang="en-US" sz="1800" b="0" i="0" u="none" strike="noStrike" dirty="0">
-                          <a:solidFill>
-                            <a:srgbClr val="000000"/>
-                          </a:solidFill>
-                          <a:effectLst/>
-                          <a:latin typeface="Calibri"/>
-                        </a:rPr>
-                        <a:t>+ Can focus on display and background simultaneously</a:t>
-                      </a:r>
-                    </a:p>
-                  </a:txBody>
-                  <a:tcPr marL="9525" marR="9525" marT="9525" marB="0" anchor="ctr"/>
-                </a:tc>
-              </a:tr>
-              <a:tr h="487680">
-                <a:tc>
-                  <a:txBody>
-                    <a:bodyPr/>
-                    <a:lstStyle/>
-                    <a:p>
-                      <a:pPr algn="l" rtl="0" fontAlgn="ctr"/>
-                      <a:r>
-                        <a:rPr lang="en-US" sz="1800" b="0" i="0" u="none" strike="noStrike" dirty="0">
-                          <a:solidFill>
-                            <a:srgbClr val="000000"/>
-                          </a:solidFill>
-                          <a:effectLst/>
-                          <a:latin typeface="Calibri"/>
-                        </a:rPr>
-                        <a:t>- </a:t>
-                      </a:r>
-                      <a:r>
-                        <a:rPr lang="en-US" sz="1800" b="0" i="0" u="none" strike="noStrike" dirty="0" smtClean="0">
-                          <a:solidFill>
-                            <a:srgbClr val="000000"/>
-                          </a:solidFill>
-                          <a:effectLst/>
-                          <a:latin typeface="Calibri"/>
-                        </a:rPr>
-                        <a:t>Poor</a:t>
-                      </a:r>
-                      <a:r>
-                        <a:rPr lang="en-US" sz="1800" b="0" i="0" u="none" strike="noStrike" baseline="0" dirty="0" smtClean="0">
-                          <a:solidFill>
-                            <a:srgbClr val="000000"/>
-                          </a:solidFill>
-                          <a:effectLst/>
-                          <a:latin typeface="Calibri"/>
-                        </a:rPr>
-                        <a:t> visibility in bright ambient light</a:t>
-                      </a:r>
-                      <a:endParaRPr lang="en-US" sz="1800" b="0" i="0" u="none" strike="noStrike" dirty="0">
-                        <a:solidFill>
-                          <a:srgbClr val="000000"/>
-                        </a:solidFill>
-                        <a:effectLst/>
-                        <a:latin typeface="Calibri"/>
-                      </a:endParaRPr>
-                    </a:p>
-                  </a:txBody>
-                  <a:tcPr marL="9525" marR="9525" marT="9525" marB="0" anchor="ctr"/>
-                </a:tc>
-                <a:tc>
-                  <a:txBody>
-                    <a:bodyPr/>
-                    <a:lstStyle/>
-                    <a:p>
-                      <a:pPr algn="l" rtl="0" fontAlgn="ctr"/>
-                      <a:r>
-                        <a:rPr lang="en-US" sz="1800" b="0" i="0" u="none" strike="noStrike" dirty="0">
-                          <a:solidFill>
-                            <a:srgbClr val="000000"/>
-                          </a:solidFill>
-                          <a:effectLst/>
-                          <a:latin typeface="Calibri"/>
-                        </a:rPr>
-                        <a:t>+ </a:t>
-                      </a:r>
-                      <a:r>
-                        <a:rPr lang="en-US" sz="1800" b="0" i="0" u="none" strike="noStrike" dirty="0" smtClean="0">
-                          <a:solidFill>
-                            <a:srgbClr val="000000"/>
-                          </a:solidFill>
-                          <a:effectLst/>
-                          <a:latin typeface="Calibri"/>
-                        </a:rPr>
-                        <a:t>Visibility not </a:t>
-                      </a:r>
-                      <a:r>
-                        <a:rPr lang="en-US" sz="1800" b="0" i="0" u="none" strike="noStrike" dirty="0">
-                          <a:solidFill>
-                            <a:srgbClr val="000000"/>
-                          </a:solidFill>
-                          <a:effectLst/>
-                          <a:latin typeface="Calibri"/>
-                        </a:rPr>
-                        <a:t>impacted by ambient light</a:t>
-                      </a:r>
-                    </a:p>
-                  </a:txBody>
-                  <a:tcPr marL="9525" marR="9525" marT="9525" marB="0" anchor="ctr"/>
-                </a:tc>
-              </a:tr>
-              <a:tr h="487680">
-                <a:tc>
-                  <a:txBody>
-                    <a:bodyPr/>
-                    <a:lstStyle/>
-                    <a:p>
-                      <a:pPr algn="l" rtl="0" fontAlgn="ctr"/>
-                      <a:r>
-                        <a:rPr lang="en-US" sz="1800" b="0" i="0" u="none" strike="noStrike" dirty="0">
-                          <a:solidFill>
-                            <a:srgbClr val="000000"/>
-                          </a:solidFill>
-                          <a:effectLst/>
-                          <a:latin typeface="Calibri"/>
-                        </a:rPr>
-                        <a:t>- More complicated/fragile construction</a:t>
-                      </a:r>
-                    </a:p>
-                  </a:txBody>
-                  <a:tcPr marL="9525" marR="9525" marT="9525" marB="0" anchor="ctr"/>
-                </a:tc>
-                <a:tc>
-                  <a:txBody>
-                    <a:bodyPr/>
-                    <a:lstStyle/>
-                    <a:p>
-                      <a:pPr algn="l" rtl="0" fontAlgn="ctr"/>
-                      <a:r>
-                        <a:rPr lang="en-US" sz="1800" b="0" i="0" u="none" strike="noStrike">
-                          <a:solidFill>
-                            <a:srgbClr val="000000"/>
-                          </a:solidFill>
-                          <a:effectLst/>
-                          <a:latin typeface="Calibri"/>
-                        </a:rPr>
-                        <a:t>+ Easier to build</a:t>
-                      </a:r>
-                    </a:p>
-                  </a:txBody>
-                  <a:tcPr marL="9525" marR="9525" marT="9525" marB="0" anchor="ctr"/>
-                </a:tc>
-              </a:tr>
-              <a:tr h="487680">
-                <a:tc>
-                  <a:txBody>
-                    <a:bodyPr/>
-                    <a:lstStyle/>
-                    <a:p>
-                      <a:pPr algn="l" rtl="0" fontAlgn="ctr"/>
-                      <a:r>
-                        <a:rPr lang="en-US" sz="1800" b="1" i="0" u="none" strike="noStrike" dirty="0">
-                          <a:solidFill>
-                            <a:schemeClr val="tx1"/>
-                          </a:solidFill>
-                          <a:effectLst/>
-                          <a:latin typeface="Calibri"/>
-                        </a:rPr>
-                        <a:t>+ Retains peripheral vision</a:t>
-                      </a:r>
-                    </a:p>
-                  </a:txBody>
-                  <a:tcPr marL="9525" marR="9525" marT="9525" marB="0" anchor="ctr"/>
-                </a:tc>
-                <a:tc>
-                  <a:txBody>
-                    <a:bodyPr/>
-                    <a:lstStyle/>
-                    <a:p>
-                      <a:pPr algn="l" rtl="0" fontAlgn="ctr"/>
-                      <a:r>
-                        <a:rPr lang="en-US" sz="1800" b="1" i="0" u="none" strike="noStrike">
-                          <a:solidFill>
-                            <a:schemeClr val="tx1"/>
-                          </a:solidFill>
-                          <a:effectLst/>
-                          <a:latin typeface="Calibri"/>
-                        </a:rPr>
-                        <a:t>- No peripheral vision</a:t>
-                      </a:r>
-                    </a:p>
-                  </a:txBody>
-                  <a:tcPr marL="9525" marR="9525" marT="9525" marB="0" anchor="ctr"/>
-                </a:tc>
-              </a:tr>
-              <a:tr h="487680">
-                <a:tc>
-                  <a:txBody>
-                    <a:bodyPr/>
-                    <a:lstStyle/>
-                    <a:p>
-                      <a:pPr algn="l" rtl="0" fontAlgn="ctr"/>
-                      <a:r>
-                        <a:rPr lang="en-US" sz="1800" b="0" i="0" u="none" strike="noStrike" dirty="0">
-                          <a:solidFill>
-                            <a:schemeClr val="tx1"/>
-                          </a:solidFill>
-                          <a:effectLst/>
-                          <a:latin typeface="Calibri"/>
-                        </a:rPr>
-                        <a:t>+ Uses no CPU/GPU</a:t>
-                      </a:r>
-                    </a:p>
-                  </a:txBody>
-                  <a:tcPr marL="9525" marR="9525" marT="9525" marB="0" anchor="ctr"/>
-                </a:tc>
-                <a:tc>
-                  <a:txBody>
-                    <a:bodyPr/>
-                    <a:lstStyle/>
-                    <a:p>
-                      <a:pPr algn="l" rtl="0" fontAlgn="ctr"/>
-                      <a:r>
-                        <a:rPr lang="en-US" sz="1800" b="0" i="0" u="none" strike="noStrike">
-                          <a:solidFill>
-                            <a:schemeClr val="tx1"/>
-                          </a:solidFill>
-                          <a:effectLst/>
-                          <a:latin typeface="Calibri"/>
-                        </a:rPr>
-                        <a:t>- Uses more processing resources</a:t>
-                      </a:r>
-                    </a:p>
-                  </a:txBody>
-                  <a:tcPr marL="9525" marR="9525" marT="9525" marB="0" anchor="ctr"/>
-                </a:tc>
-              </a:tr>
-              <a:tr h="487680">
-                <a:tc>
-                  <a:txBody>
-                    <a:bodyPr/>
-                    <a:lstStyle/>
-                    <a:p>
-                      <a:pPr algn="l" rtl="0" fontAlgn="ctr"/>
-                      <a:r>
-                        <a:rPr lang="en-US" sz="1800" b="0" i="0" u="none" strike="noStrike" dirty="0">
-                          <a:solidFill>
-                            <a:schemeClr val="tx1"/>
-                          </a:solidFill>
-                          <a:effectLst/>
-                          <a:latin typeface="Calibri"/>
-                        </a:rPr>
-                        <a:t>+ Uses no power</a:t>
-                      </a:r>
-                    </a:p>
-                  </a:txBody>
-                  <a:tcPr marL="9525" marR="9525" marT="9525" marB="0" anchor="ctr"/>
-                </a:tc>
-                <a:tc>
-                  <a:txBody>
-                    <a:bodyPr/>
-                    <a:lstStyle/>
-                    <a:p>
-                      <a:pPr algn="l" rtl="0" fontAlgn="ctr"/>
-                      <a:r>
-                        <a:rPr lang="en-US" sz="1800" b="0" i="0" u="none" strike="noStrike" dirty="0">
-                          <a:solidFill>
-                            <a:schemeClr val="tx1"/>
-                          </a:solidFill>
-                          <a:effectLst/>
-                          <a:latin typeface="Calibri"/>
-                        </a:rPr>
-                        <a:t>- Added power consumption</a:t>
-                      </a:r>
-                    </a:p>
-                  </a:txBody>
-                  <a:tcPr marL="9525" marR="9525" marT="9525" marB="0" anchor="ctr"/>
-                </a:tc>
-              </a:tr>
-              <a:tr h="487680">
-                <a:tc>
-                  <a:txBody>
-                    <a:bodyPr/>
-                    <a:lstStyle/>
-                    <a:p>
-                      <a:pPr algn="l" rtl="0" fontAlgn="ctr"/>
-                      <a:r>
-                        <a:rPr lang="en-US" sz="1800" b="0" i="0" u="none" strike="noStrike" dirty="0">
-                          <a:solidFill>
-                            <a:schemeClr val="tx1"/>
-                          </a:solidFill>
-                          <a:effectLst/>
-                          <a:latin typeface="Calibri"/>
-                        </a:rPr>
-                        <a:t>+ Retains normal vision</a:t>
-                      </a:r>
-                    </a:p>
-                  </a:txBody>
-                  <a:tcPr marL="9525" marR="9525" marT="9525" marB="0" anchor="ctr"/>
-                </a:tc>
-                <a:tc>
-                  <a:txBody>
-                    <a:bodyPr/>
-                    <a:lstStyle/>
-                    <a:p>
-                      <a:pPr algn="l" rtl="0" fontAlgn="ctr"/>
-                      <a:r>
-                        <a:rPr lang="en-US" sz="1800" b="0" i="0" u="none" strike="noStrike" dirty="0">
-                          <a:solidFill>
-                            <a:schemeClr val="tx1"/>
-                          </a:solidFill>
-                          <a:effectLst/>
-                          <a:latin typeface="Calibri"/>
-                        </a:rPr>
-                        <a:t>- Loses depth cues/resolution on background</a:t>
-                      </a:r>
-                    </a:p>
-                  </a:txBody>
-                  <a:tcPr marL="9525" marR="9525" marT="9525" marB="0" anchor="ctr"/>
-                </a:tc>
-              </a:tr>
-            </a:tbl>
-          </a:graphicData>
-        </a:graphic>
-      </p:graphicFrame>
-    </p:spTree>
-    <p:extLst>
-      <p:ext uri="{BB962C8B-B14F-4D97-AF65-F5344CB8AC3E}">
-        <p14:creationId xmlns:p14="http://schemas.microsoft.com/office/powerpoint/2010/main" val="3881715314"/>
-      </p:ext>
-    </p:extLst>
-  </p:cSld>
-  <p:clrMapOvr>
-    <a:masterClrMapping/>
-  </p:clrMapOvr>
-  <p:timing>
-    <p:tnLst>
-      <p:par>
-        <p:cTn id="1" dur="indefinite" restart="never" nodeType="tmRoot"/>
-      </p:par>
-    </p:tnLst>
-  </p:timing>
-</p:sld>
-</file>
-
-<file path=ppt/slides/slide8.xml><?xml version="1.0" encoding="utf-8"?>
-<p:sld xmlns:a="http://schemas.openxmlformats.org/drawingml/2006/main" xmlns:r="http://schemas.openxmlformats.org/officeDocument/2006/relationships" xmlns:p="http://schemas.openxmlformats.org/presentationml/2006/main">
-  <p:cSld>
-    <p:spTree>
-      <p:nvGrpSpPr>
-        <p:cNvPr id="1" name=""/>
-        <p:cNvGrpSpPr/>
-        <p:nvPr/>
-      </p:nvGrpSpPr>
-      <p:grpSpPr>
-        <a:xfrm>
-          <a:off x="0" y="0"/>
-          <a:ext cx="0" cy="0"/>
-          <a:chOff x="0" y="0"/>
-          <a:chExt cx="0" cy="0"/>
-        </a:xfrm>
-      </p:grpSpPr>
-      <p:sp>
-        <p:nvSpPr>
-          <p:cNvPr id="2" name="Title 1"/>
-          <p:cNvSpPr>
-            <a:spLocks noGrp="1"/>
-          </p:cNvSpPr>
-          <p:nvPr>
-            <p:ph type="title"/>
-          </p:nvPr>
-        </p:nvSpPr>
-        <p:spPr/>
-        <p:txBody>
-          <a:bodyPr/>
-          <a:lstStyle/>
-          <a:p>
             <a:endParaRPr lang="en-US"/>
           </a:p>
         </p:txBody>
@@ -5513,7 +4478,7 @@
 </p:sld>
 </file>
 
-<file path=ppt/slides/slide9.xml><?xml version="1.0" encoding="utf-8"?>
+<file path=ppt/slides/slide6.xml><?xml version="1.0" encoding="utf-8"?>
 <p:sld xmlns:a="http://schemas.openxmlformats.org/drawingml/2006/main" xmlns:r="http://schemas.openxmlformats.org/officeDocument/2006/relationships" xmlns:p="http://schemas.openxmlformats.org/presentationml/2006/main">
   <p:cSld>
     <p:spTree>
@@ -5626,6 +4591,331 @@
     <p:extLst>
       <p:ext uri="{BB962C8B-B14F-4D97-AF65-F5344CB8AC3E}">
         <p14:creationId xmlns:p14="http://schemas.microsoft.com/office/powerpoint/2010/main" val="1137584422"/>
+      </p:ext>
+    </p:extLst>
+  </p:cSld>
+  <p:clrMapOvr>
+    <a:masterClrMapping/>
+  </p:clrMapOvr>
+  <p:timing>
+    <p:tnLst>
+      <p:par>
+        <p:cTn id="1" dur="indefinite" restart="never" nodeType="tmRoot"/>
+      </p:par>
+    </p:tnLst>
+  </p:timing>
+</p:sld>
+</file>
+
+<file path=ppt/slides/slide7.xml><?xml version="1.0" encoding="utf-8"?>
+<p:sld xmlns:a="http://schemas.openxmlformats.org/drawingml/2006/main" xmlns:r="http://schemas.openxmlformats.org/officeDocument/2006/relationships" xmlns:p="http://schemas.openxmlformats.org/presentationml/2006/main">
+  <p:cSld>
+    <p:spTree>
+      <p:nvGrpSpPr>
+        <p:cNvPr id="1" name=""/>
+        <p:cNvGrpSpPr/>
+        <p:nvPr/>
+      </p:nvGrpSpPr>
+      <p:grpSpPr>
+        <a:xfrm>
+          <a:off x="0" y="0"/>
+          <a:ext cx="0" cy="0"/>
+          <a:chOff x="0" y="0"/>
+          <a:chExt cx="0" cy="0"/>
+        </a:xfrm>
+      </p:grpSpPr>
+      <p:sp>
+        <p:nvSpPr>
+          <p:cNvPr id="2" name="Title 1"/>
+          <p:cNvSpPr>
+            <a:spLocks noGrp="1"/>
+          </p:cNvSpPr>
+          <p:nvPr>
+            <p:ph type="title"/>
+          </p:nvPr>
+        </p:nvSpPr>
+        <p:spPr/>
+        <p:txBody>
+          <a:bodyPr/>
+          <a:lstStyle/>
+          <a:p>
+            <a:endParaRPr lang="en-US"/>
+          </a:p>
+        </p:txBody>
+      </p:sp>
+      <p:sp>
+        <p:nvSpPr>
+          <p:cNvPr id="3" name="Content Placeholder 2"/>
+          <p:cNvSpPr>
+            <a:spLocks noGrp="1"/>
+          </p:cNvSpPr>
+          <p:nvPr>
+            <p:ph idx="1"/>
+          </p:nvPr>
+        </p:nvSpPr>
+        <p:spPr/>
+        <p:txBody>
+          <a:bodyPr/>
+          <a:lstStyle/>
+          <a:p>
+            <a:endParaRPr lang="en-US"/>
+          </a:p>
+        </p:txBody>
+      </p:sp>
+      <p:pic>
+        <p:nvPicPr>
+          <p:cNvPr id="5122" name="Picture 2"/>
+          <p:cNvPicPr>
+            <a:picLocks noChangeAspect="1" noChangeArrowheads="1"/>
+          </p:cNvPicPr>
+          <p:nvPr/>
+        </p:nvPicPr>
+        <p:blipFill>
+          <a:blip r:embed="rId2">
+            <a:extLst>
+              <a:ext uri="{28A0092B-C50C-407E-A947-70E740481C1C}">
+                <a14:useLocalDpi xmlns:a14="http://schemas.microsoft.com/office/drawing/2010/main" val="0"/>
+              </a:ext>
+            </a:extLst>
+          </a:blip>
+          <a:srcRect/>
+          <a:stretch>
+            <a:fillRect/>
+          </a:stretch>
+        </p:blipFill>
+        <p:spPr bwMode="auto">
+          <a:xfrm>
+            <a:off x="26444" y="381000"/>
+            <a:ext cx="9131410" cy="5943600"/>
+          </a:xfrm>
+          <a:prstGeom prst="rect">
+            <a:avLst/>
+          </a:prstGeom>
+          <a:noFill/>
+          <a:ln>
+            <a:noFill/>
+          </a:ln>
+          <a:extLst>
+            <a:ext uri="{909E8E84-426E-40DD-AFC4-6F175D3DCCD1}">
+              <a14:hiddenFill xmlns:a14="http://schemas.microsoft.com/office/drawing/2010/main">
+                <a:solidFill>
+                  <a:schemeClr val="accent1"/>
+                </a:solidFill>
+              </a14:hiddenFill>
+            </a:ext>
+            <a:ext uri="{91240B29-F687-4F45-9708-019B960494DF}">
+              <a14:hiddenLine xmlns:a14="http://schemas.microsoft.com/office/drawing/2010/main" w="9525">
+                <a:solidFill>
+                  <a:schemeClr val="tx1"/>
+                </a:solidFill>
+                <a:miter lim="800000"/>
+                <a:headEnd/>
+                <a:tailEnd/>
+              </a14:hiddenLine>
+            </a:ext>
+          </a:extLst>
+        </p:spPr>
+      </p:pic>
+    </p:spTree>
+    <p:extLst>
+      <p:ext uri="{BB962C8B-B14F-4D97-AF65-F5344CB8AC3E}">
+        <p14:creationId xmlns:p14="http://schemas.microsoft.com/office/powerpoint/2010/main" val="4244391296"/>
+      </p:ext>
+    </p:extLst>
+  </p:cSld>
+  <p:clrMapOvr>
+    <a:masterClrMapping/>
+  </p:clrMapOvr>
+  <p:timing>
+    <p:tnLst>
+      <p:par>
+        <p:cTn id="1" dur="indefinite" restart="never" nodeType="tmRoot"/>
+      </p:par>
+    </p:tnLst>
+  </p:timing>
+</p:sld>
+</file>
+
+<file path=ppt/slides/slide8.xml><?xml version="1.0" encoding="utf-8"?>
+<p:sld xmlns:a="http://schemas.openxmlformats.org/drawingml/2006/main" xmlns:r="http://schemas.openxmlformats.org/officeDocument/2006/relationships" xmlns:p="http://schemas.openxmlformats.org/presentationml/2006/main">
+  <p:cSld>
+    <p:spTree>
+      <p:nvGrpSpPr>
+        <p:cNvPr id="1" name=""/>
+        <p:cNvGrpSpPr/>
+        <p:nvPr/>
+      </p:nvGrpSpPr>
+      <p:grpSpPr>
+        <a:xfrm>
+          <a:off x="0" y="0"/>
+          <a:ext cx="0" cy="0"/>
+          <a:chOff x="0" y="0"/>
+          <a:chExt cx="0" cy="0"/>
+        </a:xfrm>
+      </p:grpSpPr>
+      <p:sp>
+        <p:nvSpPr>
+          <p:cNvPr id="2" name="Title 1"/>
+          <p:cNvSpPr>
+            <a:spLocks noGrp="1"/>
+          </p:cNvSpPr>
+          <p:nvPr>
+            <p:ph type="title"/>
+          </p:nvPr>
+        </p:nvSpPr>
+        <p:spPr/>
+        <p:txBody>
+          <a:bodyPr/>
+          <a:lstStyle/>
+          <a:p>
+            <a:endParaRPr lang="en-US"/>
+          </a:p>
+        </p:txBody>
+      </p:sp>
+      <p:pic>
+        <p:nvPicPr>
+          <p:cNvPr id="4" name="Content Placeholder 3"/>
+          <p:cNvPicPr>
+            <a:picLocks noGrp="1" noChangeAspect="1"/>
+          </p:cNvPicPr>
+          <p:nvPr>
+            <p:ph idx="1"/>
+          </p:nvPr>
+        </p:nvPicPr>
+        <p:blipFill>
+          <a:blip r:embed="rId2" cstate="print">
+            <a:extLst>
+              <a:ext uri="{28A0092B-C50C-407E-A947-70E740481C1C}">
+                <a14:useLocalDpi xmlns:a14="http://schemas.microsoft.com/office/drawing/2010/main" val="0"/>
+              </a:ext>
+            </a:extLst>
+          </a:blip>
+          <a:stretch>
+            <a:fillRect/>
+          </a:stretch>
+        </p:blipFill>
+        <p:spPr>
+          <a:xfrm>
+            <a:off x="0" y="0"/>
+            <a:ext cx="9144000" cy="6858000"/>
+          </a:xfrm>
+        </p:spPr>
+      </p:pic>
+    </p:spTree>
+    <p:extLst>
+      <p:ext uri="{BB962C8B-B14F-4D97-AF65-F5344CB8AC3E}">
+        <p14:creationId xmlns:p14="http://schemas.microsoft.com/office/powerpoint/2010/main" val="2017911533"/>
+      </p:ext>
+    </p:extLst>
+  </p:cSld>
+  <p:clrMapOvr>
+    <a:masterClrMapping/>
+  </p:clrMapOvr>
+</p:sld>
+</file>
+
+<file path=ppt/slides/slide9.xml><?xml version="1.0" encoding="utf-8"?>
+<p:sld xmlns:a="http://schemas.openxmlformats.org/drawingml/2006/main" xmlns:r="http://schemas.openxmlformats.org/officeDocument/2006/relationships" xmlns:p="http://schemas.openxmlformats.org/presentationml/2006/main">
+  <p:cSld>
+    <p:spTree>
+      <p:nvGrpSpPr>
+        <p:cNvPr id="1" name=""/>
+        <p:cNvGrpSpPr/>
+        <p:nvPr/>
+      </p:nvGrpSpPr>
+      <p:grpSpPr>
+        <a:xfrm>
+          <a:off x="0" y="0"/>
+          <a:ext cx="0" cy="0"/>
+          <a:chOff x="0" y="0"/>
+          <a:chExt cx="0" cy="0"/>
+        </a:xfrm>
+      </p:grpSpPr>
+      <p:sp>
+        <p:nvSpPr>
+          <p:cNvPr id="2" name="Title 1"/>
+          <p:cNvSpPr>
+            <a:spLocks noGrp="1"/>
+          </p:cNvSpPr>
+          <p:nvPr>
+            <p:ph type="title"/>
+          </p:nvPr>
+        </p:nvSpPr>
+        <p:spPr/>
+        <p:txBody>
+          <a:bodyPr/>
+          <a:lstStyle/>
+          <a:p>
+            <a:r>
+              <a:rPr lang="en-US" dirty="0" smtClean="0"/>
+              <a:t>Materials and Tools</a:t>
+            </a:r>
+            <a:endParaRPr lang="en-US" dirty="0"/>
+          </a:p>
+        </p:txBody>
+      </p:sp>
+      <p:sp>
+        <p:nvSpPr>
+          <p:cNvPr id="3" name="Content Placeholder 2"/>
+          <p:cNvSpPr>
+            <a:spLocks noGrp="1"/>
+          </p:cNvSpPr>
+          <p:nvPr>
+            <p:ph idx="1"/>
+          </p:nvPr>
+        </p:nvSpPr>
+        <p:spPr/>
+        <p:txBody>
+          <a:bodyPr/>
+          <a:lstStyle/>
+          <a:p>
+            <a:r>
+              <a:rPr lang="en-US" dirty="0" smtClean="0"/>
+              <a:t>Hat/helmet</a:t>
+            </a:r>
+          </a:p>
+          <a:p>
+            <a:r>
+              <a:rPr lang="en-US" dirty="0" smtClean="0"/>
+              <a:t>Boxes for display, PCB/battery </a:t>
+            </a:r>
+            <a:r>
+              <a:rPr lang="en-US" dirty="0" smtClean="0"/>
+              <a:t>stack</a:t>
+            </a:r>
+          </a:p>
+          <a:p>
+            <a:r>
+              <a:rPr lang="en-US" dirty="0" smtClean="0"/>
+              <a:t>Angle aluminum for mounting frame</a:t>
+            </a:r>
+            <a:endParaRPr lang="en-US" dirty="0" smtClean="0"/>
+          </a:p>
+          <a:p>
+            <a:r>
+              <a:rPr lang="en-US" dirty="0" smtClean="0"/>
+              <a:t>Acrylic sheet</a:t>
+            </a:r>
+          </a:p>
+          <a:p>
+            <a:r>
+              <a:rPr lang="en-US" dirty="0" smtClean="0"/>
+              <a:t>Reflective film</a:t>
+            </a:r>
+            <a:endParaRPr lang="en-US" dirty="0" smtClean="0"/>
+          </a:p>
+          <a:p>
+            <a:pPr marL="457200" lvl="1" indent="0">
+              <a:buNone/>
+            </a:pPr>
+            <a:endParaRPr lang="en-US" dirty="0"/>
+          </a:p>
+        </p:txBody>
+      </p:sp>
+    </p:spTree>
+    <p:extLst>
+      <p:ext uri="{BB962C8B-B14F-4D97-AF65-F5344CB8AC3E}">
+        <p14:creationId xmlns:p14="http://schemas.microsoft.com/office/powerpoint/2010/main" val="931493629"/>
       </p:ext>
     </p:extLst>
   </p:cSld>

</xml_diff>